<commit_message>
feat: include slide links
</commit_message>
<xml_diff>
--- a/inst/shiny/www/templates/template.pptx
+++ b/inst/shiny/www/templates/template.pptx
@@ -5,11 +5,8 @@
     <p:sldMasterId id="2147483648" r:id="rId1"/>
   </p:sldMasterIdLst>
   <p:notesMasterIdLst>
-    <p:notesMasterId r:id="rId3"/>
+    <p:notesMasterId r:id="rId2"/>
   </p:notesMasterIdLst>
-  <p:sldIdLst>
-    <p:sldId id="256" r:id="rId2"/>
-  </p:sldIdLst>
   <p:sldSz cx="9144000" cy="5143500" type="screen16x9"/>
   <p:notesSz cx="6858000" cy="9144000"/>
   <p:defaultTextStyle>
@@ -208,7 +205,7 @@
           <a:p>
             <a:fld id="{0F9C1CCF-B725-44A7-AA57-5E433BD85C9F}" type="datetimeFigureOut">
               <a:rPr lang="en-US" smtClean="0"/>
-              <a:t>10/6/2025</a:t>
+              <a:t>10/13/2025</a:t>
             </a:fld>
             <a:endParaRPr lang="en-US"/>
           </a:p>
@@ -654,7 +651,7 @@
           <a:p>
             <a:fld id="{241EB5C9-1307-BA42-ABA2-0BC069CD8E7F}" type="datetimeFigureOut">
               <a:rPr lang="en-US" smtClean="0"/>
-              <a:t>10/6/2025</a:t>
+              <a:t>10/13/2025</a:t>
             </a:fld>
             <a:endParaRPr lang="en-US"/>
           </a:p>
@@ -822,7 +819,7 @@
           <a:p>
             <a:fld id="{241EB5C9-1307-BA42-ABA2-0BC069CD8E7F}" type="datetimeFigureOut">
               <a:rPr lang="en-US" smtClean="0"/>
-              <a:t>10/6/2025</a:t>
+              <a:t>10/13/2025</a:t>
             </a:fld>
             <a:endParaRPr lang="en-US"/>
           </a:p>
@@ -1000,7 +997,7 @@
           <a:p>
             <a:fld id="{241EB5C9-1307-BA42-ABA2-0BC069CD8E7F}" type="datetimeFigureOut">
               <a:rPr lang="en-US" smtClean="0"/>
-              <a:t>10/6/2025</a:t>
+              <a:t>10/13/2025</a:t>
             </a:fld>
             <a:endParaRPr lang="en-US"/>
           </a:p>
@@ -1168,7 +1165,7 @@
           <a:p>
             <a:fld id="{241EB5C9-1307-BA42-ABA2-0BC069CD8E7F}" type="datetimeFigureOut">
               <a:rPr lang="en-US" smtClean="0"/>
-              <a:t>10/6/2025</a:t>
+              <a:t>10/13/2025</a:t>
             </a:fld>
             <a:endParaRPr lang="en-US"/>
           </a:p>
@@ -1413,7 +1410,7 @@
           <a:p>
             <a:fld id="{241EB5C9-1307-BA42-ABA2-0BC069CD8E7F}" type="datetimeFigureOut">
               <a:rPr lang="en-US" smtClean="0"/>
-              <a:t>10/6/2025</a:t>
+              <a:t>10/13/2025</a:t>
             </a:fld>
             <a:endParaRPr lang="en-US"/>
           </a:p>
@@ -1698,7 +1695,7 @@
           <a:p>
             <a:fld id="{241EB5C9-1307-BA42-ABA2-0BC069CD8E7F}" type="datetimeFigureOut">
               <a:rPr lang="en-US" smtClean="0"/>
-              <a:t>10/6/2025</a:t>
+              <a:t>10/13/2025</a:t>
             </a:fld>
             <a:endParaRPr lang="en-US"/>
           </a:p>
@@ -2207,7 +2204,7 @@
           <a:p>
             <a:fld id="{241EB5C9-1307-BA42-ABA2-0BC069CD8E7F}" type="datetimeFigureOut">
               <a:rPr lang="en-US" smtClean="0"/>
-              <a:t>10/6/2025</a:t>
+              <a:t>10/13/2025</a:t>
             </a:fld>
             <a:endParaRPr lang="en-US"/>
           </a:p>
@@ -2324,7 +2321,7 @@
           <a:p>
             <a:fld id="{241EB5C9-1307-BA42-ABA2-0BC069CD8E7F}" type="datetimeFigureOut">
               <a:rPr lang="en-US" smtClean="0"/>
-              <a:t>10/6/2025</a:t>
+              <a:t>10/13/2025</a:t>
             </a:fld>
             <a:endParaRPr lang="en-US"/>
           </a:p>
@@ -2449,7 +2446,7 @@
           <a:p>
             <a:fld id="{241EB5C9-1307-BA42-ABA2-0BC069CD8E7F}" type="datetimeFigureOut">
               <a:rPr lang="en-US" smtClean="0"/>
-              <a:t>10/6/2025</a:t>
+              <a:t>10/13/2025</a:t>
             </a:fld>
             <a:endParaRPr lang="en-US"/>
           </a:p>
@@ -2845,7 +2842,7 @@
           <a:p>
             <a:fld id="{241EB5C9-1307-BA42-ABA2-0BC069CD8E7F}" type="datetimeFigureOut">
               <a:rPr lang="en-US" smtClean="0"/>
-              <a:t>10/6/2025</a:t>
+              <a:t>10/13/2025</a:t>
             </a:fld>
             <a:endParaRPr lang="en-US"/>
           </a:p>
@@ -3056,7 +3053,7 @@
           <a:p>
             <a:fld id="{241EB5C9-1307-BA42-ABA2-0BC069CD8E7F}" type="datetimeFigureOut">
               <a:rPr lang="en-US" smtClean="0"/>
-              <a:t>10/6/2025</a:t>
+              <a:t>10/13/2025</a:t>
             </a:fld>
             <a:endParaRPr lang="en-US"/>
           </a:p>
@@ -3412,86 +3409,6 @@
     </p:otherStyle>
   </p:txStyles>
 </p:sldMaster>
-</file>
-
-<file path=ppt/slides/slide1.xml><?xml version="1.0" encoding="utf-8"?>
-<p:sld xmlns:a="http://schemas.openxmlformats.org/drawingml/2006/main" xmlns:r="http://schemas.openxmlformats.org/officeDocument/2006/relationships" xmlns:p="http://schemas.openxmlformats.org/presentationml/2006/main">
-  <p:cSld>
-    <p:spTree>
-      <p:nvGrpSpPr>
-        <p:cNvPr id="1" name=""/>
-        <p:cNvGrpSpPr/>
-        <p:nvPr/>
-      </p:nvGrpSpPr>
-      <p:grpSpPr>
-        <a:xfrm>
-          <a:off x="0" y="0"/>
-          <a:ext cx="0" cy="0"/>
-          <a:chOff x="0" y="0"/>
-          <a:chExt cx="0" cy="0"/>
-        </a:xfrm>
-      </p:grpSpPr>
-      <p:sp>
-        <p:nvSpPr>
-          <p:cNvPr id="2" name="Title 1">
-            <a:extLst>
-              <a:ext uri="{FF2B5EF4-FFF2-40B4-BE49-F238E27FC236}">
-                <a16:creationId xmlns:a16="http://schemas.microsoft.com/office/drawing/2014/main" id="{6CD90939-9047-CCFA-B91F-6F4E994521FF}"/>
-              </a:ext>
-            </a:extLst>
-          </p:cNvPr>
-          <p:cNvSpPr>
-            <a:spLocks noGrp="1"/>
-          </p:cNvSpPr>
-          <p:nvPr>
-            <p:ph type="ctrTitle"/>
-          </p:nvPr>
-        </p:nvSpPr>
-        <p:spPr/>
-        <p:txBody>
-          <a:bodyPr/>
-          <a:lstStyle/>
-          <a:p>
-            <a:endParaRPr lang="en-US" dirty="0"/>
-          </a:p>
-        </p:txBody>
-      </p:sp>
-      <p:sp>
-        <p:nvSpPr>
-          <p:cNvPr id="3" name="Subtitle 2">
-            <a:extLst>
-              <a:ext uri="{FF2B5EF4-FFF2-40B4-BE49-F238E27FC236}">
-                <a16:creationId xmlns:a16="http://schemas.microsoft.com/office/drawing/2014/main" id="{F1C67196-6850-A070-0859-DD934AA1372D}"/>
-              </a:ext>
-            </a:extLst>
-          </p:cNvPr>
-          <p:cNvSpPr>
-            <a:spLocks noGrp="1"/>
-          </p:cNvSpPr>
-          <p:nvPr>
-            <p:ph type="subTitle" idx="1"/>
-          </p:nvPr>
-        </p:nvSpPr>
-        <p:spPr/>
-        <p:txBody>
-          <a:bodyPr/>
-          <a:lstStyle/>
-          <a:p>
-            <a:endParaRPr lang="en-US"/>
-          </a:p>
-        </p:txBody>
-      </p:sp>
-    </p:spTree>
-    <p:extLst>
-      <p:ext uri="{BB962C8B-B14F-4D97-AF65-F5344CB8AC3E}">
-        <p14:creationId xmlns:p14="http://schemas.microsoft.com/office/powerpoint/2010/main" val="117471413"/>
-      </p:ext>
-    </p:extLst>
-  </p:cSld>
-  <p:clrMapOvr>
-    <a:masterClrMapping/>
-  </p:clrMapOvr>
-</p:sld>
 </file>
 
 <file path=ppt/theme/theme1.xml><?xml version="1.0" encoding="utf-8"?>

</xml_diff>